<commit_message>
Aanpassing presentatie sprint review 2
</commit_message>
<xml_diff>
--- a/Presentaties/Sprint 2.pptx
+++ b/Presentaties/Sprint 2.pptx
@@ -6,16 +6,16 @@
   </p:sldMasterIdLst>
   <p:sldIdLst>
     <p:sldId id="256" r:id="rId5"/>
-    <p:sldId id="257" r:id="rId6"/>
-    <p:sldId id="265" r:id="rId7"/>
+    <p:sldId id="265" r:id="rId6"/>
+    <p:sldId id="257" r:id="rId7"/>
     <p:sldId id="258" r:id="rId8"/>
     <p:sldId id="259" r:id="rId9"/>
     <p:sldId id="267" r:id="rId10"/>
     <p:sldId id="266" r:id="rId11"/>
     <p:sldId id="260" r:id="rId12"/>
     <p:sldId id="261" r:id="rId13"/>
-    <p:sldId id="262" r:id="rId14"/>
-    <p:sldId id="263" r:id="rId15"/>
+    <p:sldId id="263" r:id="rId14"/>
+    <p:sldId id="262" r:id="rId15"/>
     <p:sldId id="264" r:id="rId16"/>
   </p:sldIdLst>
   <p:sldSz cx="12192000" cy="6858000"/>
@@ -3670,7 +3670,7 @@
           <a:p>
             <a:fld id="{D5EC4132-83FF-430E-8473-4C6C1D8D7455}" type="slidenum">
               <a:rPr lang="nl-NL" smtClean="0"/>
-              <a:t>‹nr.›</a:t>
+              <a:t>‹#›</a:t>
             </a:fld>
             <a:endParaRPr lang="nl-NL"/>
           </a:p>
@@ -3961,7 +3961,7 @@
           <a:p>
             <a:fld id="{D5EC4132-83FF-430E-8473-4C6C1D8D7455}" type="slidenum">
               <a:rPr lang="nl-NL" smtClean="0"/>
-              <a:t>‹nr.›</a:t>
+              <a:t>‹#›</a:t>
             </a:fld>
             <a:endParaRPr lang="nl-NL"/>
           </a:p>
@@ -4220,7 +4220,7 @@
           <a:p>
             <a:fld id="{D5EC4132-83FF-430E-8473-4C6C1D8D7455}" type="slidenum">
               <a:rPr lang="nl-NL" smtClean="0"/>
-              <a:t>‹nr.›</a:t>
+              <a:t>‹#›</a:t>
             </a:fld>
             <a:endParaRPr lang="nl-NL"/>
           </a:p>
@@ -4689,7 +4689,7 @@
           <a:p>
             <a:fld id="{D5EC4132-83FF-430E-8473-4C6C1D8D7455}" type="slidenum">
               <a:rPr lang="nl-NL" smtClean="0"/>
-              <a:t>‹nr.›</a:t>
+              <a:t>‹#›</a:t>
             </a:fld>
             <a:endParaRPr lang="nl-NL"/>
           </a:p>
@@ -4869,7 +4869,7 @@
           <a:p>
             <a:fld id="{D5EC4132-83FF-430E-8473-4C6C1D8D7455}" type="slidenum">
               <a:rPr lang="nl-NL" smtClean="0"/>
-              <a:t>‹nr.›</a:t>
+              <a:t>‹#›</a:t>
             </a:fld>
             <a:endParaRPr lang="nl-NL"/>
           </a:p>
@@ -5445,7 +5445,7 @@
           <a:p>
             <a:fld id="{D5EC4132-83FF-430E-8473-4C6C1D8D7455}" type="slidenum">
               <a:rPr lang="nl-NL" smtClean="0"/>
-              <a:t>‹nr.›</a:t>
+              <a:t>‹#›</a:t>
             </a:fld>
             <a:endParaRPr lang="nl-NL"/>
           </a:p>
@@ -5777,7 +5777,7 @@
           <a:p>
             <a:fld id="{D5EC4132-83FF-430E-8473-4C6C1D8D7455}" type="slidenum">
               <a:rPr lang="nl-NL" smtClean="0"/>
-              <a:t>‹nr.›</a:t>
+              <a:t>‹#›</a:t>
             </a:fld>
             <a:endParaRPr lang="nl-NL"/>
           </a:p>
@@ -5952,7 +5952,7 @@
           <a:p>
             <a:fld id="{D5EC4132-83FF-430E-8473-4C6C1D8D7455}" type="slidenum">
               <a:rPr lang="nl-NL" smtClean="0"/>
-              <a:t>‹nr.›</a:t>
+              <a:t>‹#›</a:t>
             </a:fld>
             <a:endParaRPr lang="nl-NL"/>
           </a:p>
@@ -6132,7 +6132,7 @@
           <a:p>
             <a:fld id="{D5EC4132-83FF-430E-8473-4C6C1D8D7455}" type="slidenum">
               <a:rPr lang="nl-NL" smtClean="0"/>
-              <a:t>‹nr.›</a:t>
+              <a:t>‹#›</a:t>
             </a:fld>
             <a:endParaRPr lang="nl-NL"/>
           </a:p>
@@ -6302,7 +6302,7 @@
           <a:p>
             <a:fld id="{D5EC4132-83FF-430E-8473-4C6C1D8D7455}" type="slidenum">
               <a:rPr lang="nl-NL" smtClean="0"/>
-              <a:t>‹nr.›</a:t>
+              <a:t>‹#›</a:t>
             </a:fld>
             <a:endParaRPr lang="nl-NL"/>
           </a:p>
@@ -6559,7 +6559,7 @@
           <a:p>
             <a:fld id="{D5EC4132-83FF-430E-8473-4C6C1D8D7455}" type="slidenum">
               <a:rPr lang="nl-NL" smtClean="0"/>
-              <a:t>‹nr.›</a:t>
+              <a:t>‹#›</a:t>
             </a:fld>
             <a:endParaRPr lang="nl-NL"/>
           </a:p>
@@ -6851,7 +6851,7 @@
           <a:p>
             <a:fld id="{D5EC4132-83FF-430E-8473-4C6C1D8D7455}" type="slidenum">
               <a:rPr lang="nl-NL" smtClean="0"/>
-              <a:t>‹nr.›</a:t>
+              <a:t>‹#›</a:t>
             </a:fld>
             <a:endParaRPr lang="nl-NL"/>
           </a:p>
@@ -7281,7 +7281,7 @@
           <a:p>
             <a:fld id="{D5EC4132-83FF-430E-8473-4C6C1D8D7455}" type="slidenum">
               <a:rPr lang="nl-NL" smtClean="0"/>
-              <a:t>‹nr.›</a:t>
+              <a:t>‹#›</a:t>
             </a:fld>
             <a:endParaRPr lang="nl-NL"/>
           </a:p>
@@ -7399,7 +7399,7 @@
           <a:p>
             <a:fld id="{D5EC4132-83FF-430E-8473-4C6C1D8D7455}" type="slidenum">
               <a:rPr lang="nl-NL" smtClean="0"/>
-              <a:t>‹nr.›</a:t>
+              <a:t>‹#›</a:t>
             </a:fld>
             <a:endParaRPr lang="nl-NL"/>
           </a:p>
@@ -7494,7 +7494,7 @@
           <a:p>
             <a:fld id="{D5EC4132-83FF-430E-8473-4C6C1D8D7455}" type="slidenum">
               <a:rPr lang="nl-NL" smtClean="0"/>
-              <a:t>‹nr.›</a:t>
+              <a:t>‹#›</a:t>
             </a:fld>
             <a:endParaRPr lang="nl-NL"/>
           </a:p>
@@ -7777,7 +7777,7 @@
           <a:p>
             <a:fld id="{D5EC4132-83FF-430E-8473-4C6C1D8D7455}" type="slidenum">
               <a:rPr lang="nl-NL" smtClean="0"/>
-              <a:t>‹nr.›</a:t>
+              <a:t>‹#›</a:t>
             </a:fld>
             <a:endParaRPr lang="nl-NL"/>
           </a:p>
@@ -8078,7 +8078,7 @@
           <a:p>
             <a:fld id="{D5EC4132-83FF-430E-8473-4C6C1D8D7455}" type="slidenum">
               <a:rPr lang="nl-NL" smtClean="0"/>
-              <a:t>‹nr.›</a:t>
+              <a:t>‹#›</a:t>
             </a:fld>
             <a:endParaRPr lang="nl-NL"/>
           </a:p>
@@ -8351,7 +8351,7 @@
           <a:p>
             <a:fld id="{D5EC4132-83FF-430E-8473-4C6C1D8D7455}" type="slidenum">
               <a:rPr lang="nl-NL" smtClean="0"/>
-              <a:t>‹nr.›</a:t>
+              <a:t>‹#›</a:t>
             </a:fld>
             <a:endParaRPr lang="nl-NL"/>
           </a:p>
@@ -9152,7 +9152,7 @@
           <p:cNvPr id="2" name="Title 1">
             <a:extLst>
               <a:ext uri="{FF2B5EF4-FFF2-40B4-BE49-F238E27FC236}">
-                <a16:creationId xmlns:a16="http://schemas.microsoft.com/office/drawing/2014/main" id="{3B316FE2-8D8C-7F98-35F4-2C37C5FA7FDA}"/>
+                <a16:creationId xmlns:a16="http://schemas.microsoft.com/office/drawing/2014/main" id="{B90C89E1-D74D-5A9F-57D4-8DA7038326EE}"/>
               </a:ext>
             </a:extLst>
           </p:cNvPr>
@@ -9169,10 +9169,9 @@
           <a:lstStyle/>
           <a:p>
             <a:r>
-              <a:rPr lang="nl-NL" dirty="0" err="1"/>
-              <a:t>retrospective</a:t>
+              <a:rPr lang="nl-NL" dirty="0"/>
+              <a:t>Volgende Sprint</a:t>
             </a:r>
-            <a:endParaRPr lang="nl-NL" dirty="0"/>
           </a:p>
         </p:txBody>
       </p:sp>
@@ -9181,7 +9180,7 @@
           <p:cNvPr id="3" name="Content Placeholder 2">
             <a:extLst>
               <a:ext uri="{FF2B5EF4-FFF2-40B4-BE49-F238E27FC236}">
-                <a16:creationId xmlns:a16="http://schemas.microsoft.com/office/drawing/2014/main" id="{D7A0D1E5-C72E-270B-6A56-8AB180F6AB69}"/>
+                <a16:creationId xmlns:a16="http://schemas.microsoft.com/office/drawing/2014/main" id="{06D64264-81B9-BCB7-DCFB-954A8780EB32}"/>
               </a:ext>
             </a:extLst>
           </p:cNvPr>
@@ -9194,25 +9193,47 @@
         </p:nvSpPr>
         <p:spPr/>
         <p:txBody>
-          <a:bodyPr/>
+          <a:bodyPr>
+            <a:normAutofit/>
+          </a:bodyPr>
           <a:lstStyle/>
           <a:p>
             <a:r>
               <a:rPr lang="nl-NL" dirty="0"/>
-              <a:t>Veel voorbereidingsstappen</a:t>
+              <a:t>Schaalmodel uitbreiden – waterpompen</a:t>
             </a:r>
           </a:p>
           <a:p>
             <a:r>
               <a:rPr lang="nl-NL" dirty="0"/>
-              <a:t>Goed vooruitzicht</a:t>
+              <a:t>Meeting opdrachtgever donderdag</a:t>
             </a:r>
           </a:p>
           <a:p>
             <a:r>
               <a:rPr lang="nl-NL" dirty="0"/>
-              <a:t>Samenwerking en communicatie</a:t>
+              <a:t>Dashboard uitbreiden – tot wensen </a:t>
             </a:r>
+            <a:br>
+              <a:rPr lang="nl-NL" dirty="0"/>
+            </a:br>
+            <a:r>
+              <a:rPr lang="nl-NL" dirty="0"/>
+              <a:t>Als gebruiker wil duidelijk kunnen zien in welke hoek de boerderij zich bevindt en in welke toestand de andere onderdelen verkeren, om een duidelijk overzicht te hebben van het systeem. </a:t>
+            </a:r>
+            <a:br>
+              <a:rPr lang="nl-NL" dirty="0"/>
+            </a:br>
+            <a:r>
+              <a:rPr lang="nl-NL" dirty="0"/>
+              <a:t>4. Uitbreiden volgens wensen opdrachtgever</a:t>
+            </a:r>
+          </a:p>
+          <a:p>
+            <a:endParaRPr lang="nl-NL" dirty="0"/>
+          </a:p>
+          <a:p>
+            <a:endParaRPr lang="nl-NL" dirty="0"/>
           </a:p>
           <a:p>
             <a:endParaRPr lang="nl-NL" dirty="0"/>
@@ -9222,7 +9243,7 @@
     </p:spTree>
     <p:extLst>
       <p:ext uri="{BB962C8B-B14F-4D97-AF65-F5344CB8AC3E}">
-        <p14:creationId xmlns:p14="http://schemas.microsoft.com/office/powerpoint/2010/main" val="3188886355"/>
+        <p14:creationId xmlns:p14="http://schemas.microsoft.com/office/powerpoint/2010/main" val="1714042999"/>
       </p:ext>
     </p:extLst>
   </p:cSld>
@@ -9254,7 +9275,7 @@
           <p:cNvPr id="2" name="Title 1">
             <a:extLst>
               <a:ext uri="{FF2B5EF4-FFF2-40B4-BE49-F238E27FC236}">
-                <a16:creationId xmlns:a16="http://schemas.microsoft.com/office/drawing/2014/main" id="{B90C89E1-D74D-5A9F-57D4-8DA7038326EE}"/>
+                <a16:creationId xmlns:a16="http://schemas.microsoft.com/office/drawing/2014/main" id="{3B316FE2-8D8C-7F98-35F4-2C37C5FA7FDA}"/>
               </a:ext>
             </a:extLst>
           </p:cNvPr>
@@ -9271,9 +9292,10 @@
           <a:lstStyle/>
           <a:p>
             <a:r>
-              <a:rPr lang="nl-NL" dirty="0"/>
-              <a:t>Volgende Sprint</a:t>
+              <a:rPr lang="nl-NL" dirty="0" err="1"/>
+              <a:t>retrospective</a:t>
             </a:r>
+            <a:endParaRPr lang="nl-NL" dirty="0"/>
           </a:p>
         </p:txBody>
       </p:sp>
@@ -9282,7 +9304,7 @@
           <p:cNvPr id="3" name="Content Placeholder 2">
             <a:extLst>
               <a:ext uri="{FF2B5EF4-FFF2-40B4-BE49-F238E27FC236}">
-                <a16:creationId xmlns:a16="http://schemas.microsoft.com/office/drawing/2014/main" id="{06D64264-81B9-BCB7-DCFB-954A8780EB32}"/>
+                <a16:creationId xmlns:a16="http://schemas.microsoft.com/office/drawing/2014/main" id="{D7A0D1E5-C72E-270B-6A56-8AB180F6AB69}"/>
               </a:ext>
             </a:extLst>
           </p:cNvPr>
@@ -9300,7 +9322,19 @@
           <a:p>
             <a:r>
               <a:rPr lang="nl-NL" dirty="0"/>
-              <a:t>Schaalmodel uitbreiden – waterpompen</a:t>
+              <a:t>Veel voorbereidingsstappen</a:t>
+            </a:r>
+          </a:p>
+          <a:p>
+            <a:r>
+              <a:rPr lang="nl-NL" dirty="0"/>
+              <a:t>Goed vooruitzicht tot taken</a:t>
+            </a:r>
+          </a:p>
+          <a:p>
+            <a:r>
+              <a:rPr lang="nl-NL" dirty="0"/>
+              <a:t>Samenwerking en communicatie</a:t>
             </a:r>
           </a:p>
           <a:p>
@@ -9311,7 +9345,7 @@
     </p:spTree>
     <p:extLst>
       <p:ext uri="{BB962C8B-B14F-4D97-AF65-F5344CB8AC3E}">
-        <p14:creationId xmlns:p14="http://schemas.microsoft.com/office/powerpoint/2010/main" val="1714042999"/>
+        <p14:creationId xmlns:p14="http://schemas.microsoft.com/office/powerpoint/2010/main" val="3188886355"/>
       </p:ext>
     </p:extLst>
   </p:cSld>
@@ -9405,6 +9439,200 @@
 </file>
 
 <file path=ppt/slides/slide2.xml><?xml version="1.0" encoding="utf-8"?>
+<p:sld xmlns:a="http://schemas.openxmlformats.org/drawingml/2006/main" xmlns:r="http://schemas.openxmlformats.org/officeDocument/2006/relationships" xmlns:p="http://schemas.openxmlformats.org/presentationml/2006/main">
+  <p:cSld>
+    <p:bg>
+      <p:bgPr>
+        <a:blipFill rotWithShape="1">
+          <a:blip r:embed="rId2">
+            <a:duotone>
+              <a:schemeClr val="bg2">
+                <a:shade val="28000"/>
+                <a:satMod val="94000"/>
+                <a:lumMod val="20000"/>
+              </a:schemeClr>
+              <a:schemeClr val="bg2">
+                <a:tint val="94000"/>
+                <a:shade val="84000"/>
+                <a:satMod val="148000"/>
+                <a:lumMod val="114000"/>
+              </a:schemeClr>
+            </a:duotone>
+          </a:blip>
+          <a:stretch/>
+        </a:blipFill>
+        <a:effectLst/>
+      </p:bgPr>
+    </p:bg>
+    <p:spTree>
+      <p:nvGrpSpPr>
+        <p:cNvPr id="1" name=""/>
+        <p:cNvGrpSpPr/>
+        <p:nvPr/>
+      </p:nvGrpSpPr>
+      <p:grpSpPr>
+        <a:xfrm>
+          <a:off x="0" y="0"/>
+          <a:ext cx="0" cy="0"/>
+          <a:chOff x="0" y="0"/>
+          <a:chExt cx="0" cy="0"/>
+        </a:xfrm>
+      </p:grpSpPr>
+      <p:sp>
+        <p:nvSpPr>
+          <p:cNvPr id="2" name="Title 1">
+            <a:extLst>
+              <a:ext uri="{FF2B5EF4-FFF2-40B4-BE49-F238E27FC236}">
+                <a16:creationId xmlns:a16="http://schemas.microsoft.com/office/drawing/2014/main" id="{56127615-3D95-9288-3494-F58B31754AED}"/>
+              </a:ext>
+            </a:extLst>
+          </p:cNvPr>
+          <p:cNvSpPr>
+            <a:spLocks noGrp="1"/>
+          </p:cNvSpPr>
+          <p:nvPr>
+            <p:ph type="title"/>
+          </p:nvPr>
+        </p:nvSpPr>
+        <p:spPr>
+          <a:xfrm>
+            <a:off x="1751012" y="4363271"/>
+            <a:ext cx="8676222" cy="1066801"/>
+          </a:xfrm>
+        </p:spPr>
+        <p:txBody>
+          <a:bodyPr vert="horz" lIns="91440" tIns="45720" rIns="91440" bIns="45720" rtlCol="0" anchor="b">
+            <a:normAutofit/>
+          </a:bodyPr>
+          <a:lstStyle/>
+          <a:p>
+            <a:pPr algn="ctr"/>
+            <a:r>
+              <a:rPr lang="en-US" sz="4800" dirty="0">
+                <a:effectLst>
+                  <a:glow rad="38100">
+                    <a:schemeClr val="bg1">
+                      <a:lumMod val="65000"/>
+                      <a:lumOff val="35000"/>
+                      <a:alpha val="50000"/>
+                    </a:schemeClr>
+                  </a:glow>
+                  <a:outerShdw blurRad="28575" dist="31750" dir="13200000" algn="tl" rotWithShape="0">
+                    <a:srgbClr val="000000">
+                      <a:alpha val="25000"/>
+                    </a:srgbClr>
+                  </a:outerShdw>
+                </a:effectLst>
+              </a:rPr>
+              <a:t>Recap</a:t>
+            </a:r>
+          </a:p>
+        </p:txBody>
+      </p:sp>
+      <p:sp>
+        <p:nvSpPr>
+          <p:cNvPr id="3" name="Content Placeholder 2">
+            <a:extLst>
+              <a:ext uri="{FF2B5EF4-FFF2-40B4-BE49-F238E27FC236}">
+                <a16:creationId xmlns:a16="http://schemas.microsoft.com/office/drawing/2014/main" id="{F0D5F587-718E-8155-3A8F-2D329323EF03}"/>
+              </a:ext>
+            </a:extLst>
+          </p:cNvPr>
+          <p:cNvSpPr>
+            <a:spLocks noGrp="1"/>
+          </p:cNvSpPr>
+          <p:nvPr>
+            <p:ph idx="1"/>
+          </p:nvPr>
+        </p:nvSpPr>
+        <p:spPr>
+          <a:xfrm>
+            <a:off x="1751012" y="5516211"/>
+            <a:ext cx="8676222" cy="722243"/>
+          </a:xfrm>
+        </p:spPr>
+        <p:txBody>
+          <a:bodyPr vert="horz" lIns="91440" tIns="45720" rIns="91440" bIns="45720" rtlCol="0" anchor="t">
+            <a:normAutofit/>
+          </a:bodyPr>
+          <a:lstStyle/>
+          <a:p>
+            <a:pPr marL="0" indent="0" algn="ctr">
+              <a:buNone/>
+            </a:pPr>
+            <a:r>
+              <a:rPr lang="en-US" sz="2100">
+                <a:gradFill flip="none" rotWithShape="1">
+                  <a:gsLst>
+                    <a:gs pos="0">
+                      <a:schemeClr val="tx1"/>
+                    </a:gs>
+                    <a:gs pos="100000">
+                      <a:schemeClr val="tx1">
+                        <a:lumMod val="75000"/>
+                      </a:schemeClr>
+                    </a:gs>
+                  </a:gsLst>
+                  <a:lin ang="5400000" scaled="0"/>
+                  <a:tileRect/>
+                </a:gradFill>
+              </a:rPr>
+              <a:t>Floating Farm?</a:t>
+            </a:r>
+          </a:p>
+        </p:txBody>
+      </p:sp>
+      <p:pic>
+        <p:nvPicPr>
+          <p:cNvPr id="5" name="Afbeelding 4" descr="Afbeelding met buitenshuis, plant, staal&#10;&#10;Door AI gegenereerde inhoud is mogelijk onjuist.">
+            <a:extLst>
+              <a:ext uri="{FF2B5EF4-FFF2-40B4-BE49-F238E27FC236}">
+                <a16:creationId xmlns:a16="http://schemas.microsoft.com/office/drawing/2014/main" id="{3BE6EB31-DD18-B678-8AFC-57EDDEF3E305}"/>
+              </a:ext>
+            </a:extLst>
+          </p:cNvPr>
+          <p:cNvPicPr>
+            <a:picLocks noChangeAspect="1"/>
+          </p:cNvPicPr>
+          <p:nvPr/>
+        </p:nvPicPr>
+        <p:blipFill>
+          <a:blip r:embed="rId3">
+            <a:extLst>
+              <a:ext uri="{28A0092B-C50C-407E-A947-70E740481C1C}">
+                <a14:useLocalDpi xmlns:a14="http://schemas.microsoft.com/office/drawing/2010/main" val="0"/>
+              </a:ext>
+            </a:extLst>
+          </a:blip>
+          <a:srcRect t="32637" b="14650"/>
+          <a:stretch>
+            <a:fillRect/>
+          </a:stretch>
+        </p:blipFill>
+        <p:spPr>
+          <a:xfrm>
+            <a:off x="20" y="10"/>
+            <a:ext cx="12191980" cy="4273816"/>
+          </a:xfrm>
+          <a:prstGeom prst="rect">
+            <a:avLst/>
+          </a:prstGeom>
+        </p:spPr>
+      </p:pic>
+    </p:spTree>
+    <p:extLst>
+      <p:ext uri="{BB962C8B-B14F-4D97-AF65-F5344CB8AC3E}">
+        <p14:creationId xmlns:p14="http://schemas.microsoft.com/office/powerpoint/2010/main" val="2964512786"/>
+      </p:ext>
+    </p:extLst>
+  </p:cSld>
+  <p:clrMapOvr>
+    <a:masterClrMapping/>
+  </p:clrMapOvr>
+</p:sld>
+</file>
+
+<file path=ppt/slides/slide3.xml><?xml version="1.0" encoding="utf-8"?>
 <p:sld xmlns:a="http://schemas.openxmlformats.org/drawingml/2006/main" xmlns:r="http://schemas.openxmlformats.org/officeDocument/2006/relationships" xmlns:p="http://schemas.openxmlformats.org/presentationml/2006/main">
   <p:cSld>
     <p:bg>
@@ -9750,200 +9978,6 @@
 </p:sld>
 </file>
 
-<file path=ppt/slides/slide3.xml><?xml version="1.0" encoding="utf-8"?>
-<p:sld xmlns:a="http://schemas.openxmlformats.org/drawingml/2006/main" xmlns:r="http://schemas.openxmlformats.org/officeDocument/2006/relationships" xmlns:p="http://schemas.openxmlformats.org/presentationml/2006/main">
-  <p:cSld>
-    <p:bg>
-      <p:bgPr>
-        <a:blipFill rotWithShape="1">
-          <a:blip r:embed="rId2">
-            <a:duotone>
-              <a:schemeClr val="bg2">
-                <a:shade val="28000"/>
-                <a:satMod val="94000"/>
-                <a:lumMod val="20000"/>
-              </a:schemeClr>
-              <a:schemeClr val="bg2">
-                <a:tint val="94000"/>
-                <a:shade val="84000"/>
-                <a:satMod val="148000"/>
-                <a:lumMod val="114000"/>
-              </a:schemeClr>
-            </a:duotone>
-          </a:blip>
-          <a:stretch/>
-        </a:blipFill>
-        <a:effectLst/>
-      </p:bgPr>
-    </p:bg>
-    <p:spTree>
-      <p:nvGrpSpPr>
-        <p:cNvPr id="1" name=""/>
-        <p:cNvGrpSpPr/>
-        <p:nvPr/>
-      </p:nvGrpSpPr>
-      <p:grpSpPr>
-        <a:xfrm>
-          <a:off x="0" y="0"/>
-          <a:ext cx="0" cy="0"/>
-          <a:chOff x="0" y="0"/>
-          <a:chExt cx="0" cy="0"/>
-        </a:xfrm>
-      </p:grpSpPr>
-      <p:sp>
-        <p:nvSpPr>
-          <p:cNvPr id="2" name="Title 1">
-            <a:extLst>
-              <a:ext uri="{FF2B5EF4-FFF2-40B4-BE49-F238E27FC236}">
-                <a16:creationId xmlns:a16="http://schemas.microsoft.com/office/drawing/2014/main" id="{56127615-3D95-9288-3494-F58B31754AED}"/>
-              </a:ext>
-            </a:extLst>
-          </p:cNvPr>
-          <p:cNvSpPr>
-            <a:spLocks noGrp="1"/>
-          </p:cNvSpPr>
-          <p:nvPr>
-            <p:ph type="title"/>
-          </p:nvPr>
-        </p:nvSpPr>
-        <p:spPr>
-          <a:xfrm>
-            <a:off x="1751012" y="4363271"/>
-            <a:ext cx="8676222" cy="1066801"/>
-          </a:xfrm>
-        </p:spPr>
-        <p:txBody>
-          <a:bodyPr vert="horz" lIns="91440" tIns="45720" rIns="91440" bIns="45720" rtlCol="0" anchor="b">
-            <a:normAutofit/>
-          </a:bodyPr>
-          <a:lstStyle/>
-          <a:p>
-            <a:pPr algn="ctr"/>
-            <a:r>
-              <a:rPr lang="en-US" sz="4800" dirty="0">
-                <a:effectLst>
-                  <a:glow rad="38100">
-                    <a:schemeClr val="bg1">
-                      <a:lumMod val="65000"/>
-                      <a:lumOff val="35000"/>
-                      <a:alpha val="50000"/>
-                    </a:schemeClr>
-                  </a:glow>
-                  <a:outerShdw blurRad="28575" dist="31750" dir="13200000" algn="tl" rotWithShape="0">
-                    <a:srgbClr val="000000">
-                      <a:alpha val="25000"/>
-                    </a:srgbClr>
-                  </a:outerShdw>
-                </a:effectLst>
-              </a:rPr>
-              <a:t>Recap</a:t>
-            </a:r>
-          </a:p>
-        </p:txBody>
-      </p:sp>
-      <p:sp>
-        <p:nvSpPr>
-          <p:cNvPr id="3" name="Content Placeholder 2">
-            <a:extLst>
-              <a:ext uri="{FF2B5EF4-FFF2-40B4-BE49-F238E27FC236}">
-                <a16:creationId xmlns:a16="http://schemas.microsoft.com/office/drawing/2014/main" id="{F0D5F587-718E-8155-3A8F-2D329323EF03}"/>
-              </a:ext>
-            </a:extLst>
-          </p:cNvPr>
-          <p:cNvSpPr>
-            <a:spLocks noGrp="1"/>
-          </p:cNvSpPr>
-          <p:nvPr>
-            <p:ph idx="1"/>
-          </p:nvPr>
-        </p:nvSpPr>
-        <p:spPr>
-          <a:xfrm>
-            <a:off x="1751012" y="5516211"/>
-            <a:ext cx="8676222" cy="722243"/>
-          </a:xfrm>
-        </p:spPr>
-        <p:txBody>
-          <a:bodyPr vert="horz" lIns="91440" tIns="45720" rIns="91440" bIns="45720" rtlCol="0" anchor="t">
-            <a:normAutofit/>
-          </a:bodyPr>
-          <a:lstStyle/>
-          <a:p>
-            <a:pPr marL="0" indent="0" algn="ctr">
-              <a:buNone/>
-            </a:pPr>
-            <a:r>
-              <a:rPr lang="en-US" sz="2100">
-                <a:gradFill flip="none" rotWithShape="1">
-                  <a:gsLst>
-                    <a:gs pos="0">
-                      <a:schemeClr val="tx1"/>
-                    </a:gs>
-                    <a:gs pos="100000">
-                      <a:schemeClr val="tx1">
-                        <a:lumMod val="75000"/>
-                      </a:schemeClr>
-                    </a:gs>
-                  </a:gsLst>
-                  <a:lin ang="5400000" scaled="0"/>
-                  <a:tileRect/>
-                </a:gradFill>
-              </a:rPr>
-              <a:t>Floating Farm?</a:t>
-            </a:r>
-          </a:p>
-        </p:txBody>
-      </p:sp>
-      <p:pic>
-        <p:nvPicPr>
-          <p:cNvPr id="5" name="Afbeelding 4" descr="Afbeelding met buitenshuis, plant, staal&#10;&#10;Door AI gegenereerde inhoud is mogelijk onjuist.">
-            <a:extLst>
-              <a:ext uri="{FF2B5EF4-FFF2-40B4-BE49-F238E27FC236}">
-                <a16:creationId xmlns:a16="http://schemas.microsoft.com/office/drawing/2014/main" id="{3BE6EB31-DD18-B678-8AFC-57EDDEF3E305}"/>
-              </a:ext>
-            </a:extLst>
-          </p:cNvPr>
-          <p:cNvPicPr>
-            <a:picLocks noChangeAspect="1"/>
-          </p:cNvPicPr>
-          <p:nvPr/>
-        </p:nvPicPr>
-        <p:blipFill>
-          <a:blip r:embed="rId3">
-            <a:extLst>
-              <a:ext uri="{28A0092B-C50C-407E-A947-70E740481C1C}">
-                <a14:useLocalDpi xmlns:a14="http://schemas.microsoft.com/office/drawing/2010/main" val="0"/>
-              </a:ext>
-            </a:extLst>
-          </a:blip>
-          <a:srcRect t="32637" b="14650"/>
-          <a:stretch>
-            <a:fillRect/>
-          </a:stretch>
-        </p:blipFill>
-        <p:spPr>
-          <a:xfrm>
-            <a:off x="20" y="10"/>
-            <a:ext cx="12191980" cy="4273816"/>
-          </a:xfrm>
-          <a:prstGeom prst="rect">
-            <a:avLst/>
-          </a:prstGeom>
-        </p:spPr>
-      </p:pic>
-    </p:spTree>
-    <p:extLst>
-      <p:ext uri="{BB962C8B-B14F-4D97-AF65-F5344CB8AC3E}">
-        <p14:creationId xmlns:p14="http://schemas.microsoft.com/office/powerpoint/2010/main" val="2964512786"/>
-      </p:ext>
-    </p:extLst>
-  </p:cSld>
-  <p:clrMapOvr>
-    <a:masterClrMapping/>
-  </p:clrMapOvr>
-</p:sld>
-</file>
-
 <file path=ppt/slides/slide4.xml><?xml version="1.0" encoding="utf-8"?>
 <p:sld xmlns:a="http://schemas.openxmlformats.org/drawingml/2006/main" xmlns:r="http://schemas.openxmlformats.org/officeDocument/2006/relationships" xmlns:p="http://schemas.openxmlformats.org/presentationml/2006/main">
   <p:cSld>
@@ -10012,13 +10046,8 @@
           <a:p>
             <a:r>
               <a:rPr lang="nl-NL" dirty="0"/>
-              <a:t>Pompen </a:t>
+              <a:t>Miniatuur pompen onderzoeken</a:t>
             </a:r>
-            <a:r>
-              <a:rPr lang="nl-NL" dirty="0" err="1"/>
-              <a:t>onzerzoeken</a:t>
-            </a:r>
-            <a:endParaRPr lang="nl-NL" dirty="0"/>
           </a:p>
           <a:p>
             <a:r>
@@ -10034,7 +10063,7 @@
           <a:p>
             <a:r>
               <a:rPr lang="nl-NL" dirty="0"/>
-              <a:t>Waterdichtheid onderzoeken</a:t>
+              <a:t>Waterdichtheid?</a:t>
             </a:r>
           </a:p>
           <a:p>
@@ -13386,7 +13415,7 @@
           <a:p>
             <a:r>
               <a:rPr lang="nl-NL" dirty="0"/>
-              <a:t>Andere taken die niet tot een User story behoren?</a:t>
+              <a:t>Andere taken?</a:t>
             </a:r>
           </a:p>
         </p:txBody>
@@ -13414,11 +13443,89 @@
           <a:p>
             <a:r>
               <a:rPr lang="nl-NL" dirty="0"/>
-              <a:t>Onderzoeken hoe groot de ballasttanks moeten zijn</a:t>
+              <a:t>Alternatieven?</a:t>
+            </a:r>
+          </a:p>
+          <a:p>
+            <a:r>
+              <a:rPr lang="nl-NL" dirty="0"/>
+              <a:t>Waterdichtheid?</a:t>
             </a:r>
           </a:p>
         </p:txBody>
       </p:sp>
+      <p:pic>
+        <p:nvPicPr>
+          <p:cNvPr id="5" name="Picture 4" descr="A house in the sky with balloons&#10;&#10;AI-generated content may be incorrect.">
+            <a:extLst>
+              <a:ext uri="{FF2B5EF4-FFF2-40B4-BE49-F238E27FC236}">
+                <a16:creationId xmlns:a16="http://schemas.microsoft.com/office/drawing/2014/main" id="{6040765F-E387-0EFC-5B3F-FA4CB4F23E42}"/>
+              </a:ext>
+            </a:extLst>
+          </p:cNvPr>
+          <p:cNvPicPr>
+            <a:picLocks noChangeAspect="1"/>
+          </p:cNvPicPr>
+          <p:nvPr/>
+        </p:nvPicPr>
+        <p:blipFill>
+          <a:blip r:embed="rId2">
+            <a:extLst>
+              <a:ext uri="{28A0092B-C50C-407E-A947-70E740481C1C}">
+                <a14:useLocalDpi xmlns:a14="http://schemas.microsoft.com/office/drawing/2010/main" val="0"/>
+              </a:ext>
+            </a:extLst>
+          </a:blip>
+          <a:stretch>
+            <a:fillRect/>
+          </a:stretch>
+        </p:blipFill>
+        <p:spPr>
+          <a:xfrm>
+            <a:off x="5098382" y="339892"/>
+            <a:ext cx="5905500" cy="3543300"/>
+          </a:xfrm>
+          <a:prstGeom prst="rect">
+            <a:avLst/>
+          </a:prstGeom>
+        </p:spPr>
+      </p:pic>
+      <p:pic>
+        <p:nvPicPr>
+          <p:cNvPr id="7" name="Picture 6" descr="A roll of duct tape&#10;&#10;AI-generated content may be incorrect.">
+            <a:extLst>
+              <a:ext uri="{FF2B5EF4-FFF2-40B4-BE49-F238E27FC236}">
+                <a16:creationId xmlns:a16="http://schemas.microsoft.com/office/drawing/2014/main" id="{C2A11E88-FBB5-2ABB-EE24-10FD810555D0}"/>
+              </a:ext>
+            </a:extLst>
+          </p:cNvPr>
+          <p:cNvPicPr>
+            <a:picLocks noChangeAspect="1"/>
+          </p:cNvPicPr>
+          <p:nvPr/>
+        </p:nvPicPr>
+        <p:blipFill>
+          <a:blip r:embed="rId3">
+            <a:extLst>
+              <a:ext uri="{28A0092B-C50C-407E-A947-70E740481C1C}">
+                <a14:useLocalDpi xmlns:a14="http://schemas.microsoft.com/office/drawing/2010/main" val="0"/>
+              </a:ext>
+            </a:extLst>
+          </a:blip>
+          <a:stretch>
+            <a:fillRect/>
+          </a:stretch>
+        </p:blipFill>
+        <p:spPr>
+          <a:xfrm>
+            <a:off x="5054867" y="4076700"/>
+            <a:ext cx="2254317" cy="2171700"/>
+          </a:xfrm>
+          <a:prstGeom prst="rect">
+            <a:avLst/>
+          </a:prstGeom>
+        </p:spPr>
+      </p:pic>
     </p:spTree>
     <p:extLst>
       <p:ext uri="{BB962C8B-B14F-4D97-AF65-F5344CB8AC3E}">
@@ -14165,9 +14272,14 @@
           <a:p>
             <a:pPr algn="ctr"/>
             <a:r>
-              <a:rPr lang="nl-NL"/>
-              <a:t>Voortgang User Stories</a:t>
+              <a:rPr lang="nl-NL" dirty="0"/>
+              <a:t>Voortgang User </a:t>
             </a:r>
+            <a:r>
+              <a:rPr lang="nl-NL" dirty="0" err="1"/>
+              <a:t>Stories</a:t>
+            </a:r>
+            <a:endParaRPr lang="nl-NL" dirty="0"/>
           </a:p>
         </p:txBody>
       </p:sp>
@@ -14201,7 +14313,7 @@
           <a:p>
             <a:r>
               <a:rPr lang="nl-NL" dirty="0"/>
-              <a:t>Ik wil duidelijk kunnen zien in welke hoek de boerderij zich bevindt en in welke toestand de andere onderdelen verkeren, om een duidelijk overzicht te hebben van het systeem. </a:t>
+              <a:t>Als gebruiker wil duidelijk kunnen zien in welke hoek de boerderij zich bevindt en in welke toestand de andere onderdelen verkeren, om een duidelijk overzicht te hebben van het systeem. </a:t>
             </a:r>
           </a:p>
           <a:p>
@@ -14510,6 +14622,23 @@
 </file>
 
 <file path=customXml/item1.xml><?xml version="1.0" encoding="utf-8"?>
+<p:properties xmlns:p="http://schemas.microsoft.com/office/2006/metadata/properties" xmlns:xsi="http://www.w3.org/2001/XMLSchema-instance" xmlns:pc="http://schemas.microsoft.com/office/infopath/2007/PartnerControls">
+  <documentManagement>
+    <_activity xmlns="8d5dcd13-9b93-4860-8686-258dec0e23be" xsi:nil="true"/>
+  </documentManagement>
+</p:properties>
+</file>
+
+<file path=customXml/item2.xml><?xml version="1.0" encoding="utf-8"?>
+<?mso-contentType ?>
+<FormTemplates xmlns="http://schemas.microsoft.com/sharepoint/v3/contenttype/forms">
+  <Display>DocumentLibraryForm</Display>
+  <Edit>DocumentLibraryForm</Edit>
+  <New>DocumentLibraryForm</New>
+</FormTemplates>
+</file>
+
+<file path=customXml/item3.xml><?xml version="1.0" encoding="utf-8"?>
 <ct:contentTypeSchema xmlns:ct="http://schemas.microsoft.com/office/2006/metadata/contentType" xmlns:ma="http://schemas.microsoft.com/office/2006/metadata/properties/metaAttributes" ct:_="" ma:_="" ma:contentTypeName="Document" ma:contentTypeID="0x01010079D7DB9D69D51D4199EBB83E098F6C13" ma:contentTypeVersion="12" ma:contentTypeDescription="Create a new document." ma:contentTypeScope="" ma:versionID="ceb163bb5f87e201cdc653da3b4d8be7">
   <xsd:schema xmlns:xsd="http://www.w3.org/2001/XMLSchema" xmlns:xs="http://www.w3.org/2001/XMLSchema" xmlns:p="http://schemas.microsoft.com/office/2006/metadata/properties" xmlns:ns3="8d5dcd13-9b93-4860-8686-258dec0e23be" targetNamespace="http://schemas.microsoft.com/office/2006/metadata/properties" ma:root="true" ma:fieldsID="28cc82626ae761b4ac7541494d6f1d1e" ns3:_="">
     <xsd:import namespace="8d5dcd13-9b93-4860-8686-258dec0e23be"/>
@@ -14703,24 +14832,31 @@
 </ct:contentTypeSchema>
 </file>
 
-<file path=customXml/item2.xml><?xml version="1.0" encoding="utf-8"?>
-<?mso-contentType ?>
-<FormTemplates xmlns="http://schemas.microsoft.com/sharepoint/v3/contenttype/forms">
-  <Display>DocumentLibraryForm</Display>
-  <Edit>DocumentLibraryForm</Edit>
-  <New>DocumentLibraryForm</New>
-</FormTemplates>
+<file path=customXml/itemProps1.xml><?xml version="1.0" encoding="utf-8"?>
+<ds:datastoreItem xmlns:ds="http://schemas.openxmlformats.org/officeDocument/2006/customXml" ds:itemID="{6BE63DC0-0E79-4D45-AB99-081F8145E24C}">
+  <ds:schemaRefs>
+    <ds:schemaRef ds:uri="http://purl.org/dc/terms/"/>
+    <ds:schemaRef ds:uri="http://schemas.microsoft.com/office/infopath/2007/PartnerControls"/>
+    <ds:schemaRef ds:uri="http://schemas.openxmlformats.org/package/2006/metadata/core-properties"/>
+    <ds:schemaRef ds:uri="http://purl.org/dc/elements/1.1/"/>
+    <ds:schemaRef ds:uri="http://schemas.microsoft.com/office/2006/documentManagement/types"/>
+    <ds:schemaRef ds:uri="http://www.w3.org/XML/1998/namespace"/>
+    <ds:schemaRef ds:uri="8d5dcd13-9b93-4860-8686-258dec0e23be"/>
+    <ds:schemaRef ds:uri="http://schemas.microsoft.com/office/2006/metadata/properties"/>
+    <ds:schemaRef ds:uri="http://purl.org/dc/dcmitype/"/>
+  </ds:schemaRefs>
+</ds:datastoreItem>
 </file>
 
-<file path=customXml/item3.xml><?xml version="1.0" encoding="utf-8"?>
-<p:properties xmlns:p="http://schemas.microsoft.com/office/2006/metadata/properties" xmlns:xsi="http://www.w3.org/2001/XMLSchema-instance" xmlns:pc="http://schemas.microsoft.com/office/infopath/2007/PartnerControls">
-  <documentManagement>
-    <_activity xmlns="8d5dcd13-9b93-4860-8686-258dec0e23be" xsi:nil="true"/>
-  </documentManagement>
-</p:properties>
+<file path=customXml/itemProps2.xml><?xml version="1.0" encoding="utf-8"?>
+<ds:datastoreItem xmlns:ds="http://schemas.openxmlformats.org/officeDocument/2006/customXml" ds:itemID="{33D4CFAA-434D-4462-B62D-1E23E4045646}">
+  <ds:schemaRefs>
+    <ds:schemaRef ds:uri="http://schemas.microsoft.com/sharepoint/v3/contenttype/forms"/>
+  </ds:schemaRefs>
+</ds:datastoreItem>
 </file>
 
-<file path=customXml/itemProps1.xml><?xml version="1.0" encoding="utf-8"?>
+<file path=customXml/itemProps3.xml><?xml version="1.0" encoding="utf-8"?>
 <ds:datastoreItem xmlns:ds="http://schemas.openxmlformats.org/officeDocument/2006/customXml" ds:itemID="{7685628E-9CEE-488E-843E-DA0262089D08}">
   <ds:schemaRefs>
     <ds:schemaRef ds:uri="http://schemas.microsoft.com/office/2006/metadata/contentType"/>
@@ -14736,28 +14872,4 @@
     <ds:schemaRef ds:uri="http://schemas.microsoft.com/internal/obd"/>
   </ds:schemaRefs>
 </ds:datastoreItem>
-</file>
-
-<file path=customXml/itemProps2.xml><?xml version="1.0" encoding="utf-8"?>
-<ds:datastoreItem xmlns:ds="http://schemas.openxmlformats.org/officeDocument/2006/customXml" ds:itemID="{33D4CFAA-434D-4462-B62D-1E23E4045646}">
-  <ds:schemaRefs>
-    <ds:schemaRef ds:uri="http://schemas.microsoft.com/sharepoint/v3/contenttype/forms"/>
-  </ds:schemaRefs>
-</ds:datastoreItem>
-</file>
-
-<file path=customXml/itemProps3.xml><?xml version="1.0" encoding="utf-8"?>
-<ds:datastoreItem xmlns:ds="http://schemas.openxmlformats.org/officeDocument/2006/customXml" ds:itemID="{6BE63DC0-0E79-4D45-AB99-081F8145E24C}">
-  <ds:schemaRefs>
-    <ds:schemaRef ds:uri="http://purl.org/dc/terms/"/>
-    <ds:schemaRef ds:uri="http://schemas.microsoft.com/office/infopath/2007/PartnerControls"/>
-    <ds:schemaRef ds:uri="http://schemas.openxmlformats.org/package/2006/metadata/core-properties"/>
-    <ds:schemaRef ds:uri="http://purl.org/dc/elements/1.1/"/>
-    <ds:schemaRef ds:uri="http://schemas.microsoft.com/office/2006/documentManagement/types"/>
-    <ds:schemaRef ds:uri="http://www.w3.org/XML/1998/namespace"/>
-    <ds:schemaRef ds:uri="8d5dcd13-9b93-4860-8686-258dec0e23be"/>
-    <ds:schemaRef ds:uri="http://schemas.microsoft.com/office/2006/metadata/properties"/>
-    <ds:schemaRef ds:uri="http://purl.org/dc/dcmitype/"/>
-  </ds:schemaRefs>
-</ds:datastoreItem>
 </file>
</xml_diff>

<commit_message>
puntjes op de i van de presentatie
</commit_message>
<xml_diff>
--- a/Presentaties/Sprint 2.pptx
+++ b/Presentaties/Sprint 2.pptx
@@ -909,7 +909,7 @@
 <dgm:dataModel xmlns:dgm="http://schemas.openxmlformats.org/drawingml/2006/diagram" xmlns:a="http://schemas.openxmlformats.org/drawingml/2006/main">
   <dgm:ptLst>
     <dgm:pt modelId="{67DA44AA-7B44-4C6A-8E45-1D4360E100E0}" type="doc">
-      <dgm:prSet loTypeId="urn:microsoft.com/office/officeart/2008/layout/LinedList" loCatId="list" qsTypeId="urn:microsoft.com/office/officeart/2005/8/quickstyle/simple4" qsCatId="simple" csTypeId="urn:microsoft.com/office/officeart/2005/8/colors/colorful2" csCatId="colorful"/>
+      <dgm:prSet loTypeId="urn:microsoft.com/office/officeart/2008/layout/LinedList" loCatId="list" qsTypeId="urn:microsoft.com/office/officeart/2005/8/quickstyle/simple4" qsCatId="simple" csTypeId="urn:microsoft.com/office/officeart/2005/8/colors/colorful2" csCatId="colorful" phldr="1"/>
       <dgm:spPr/>
       <dgm:t>
         <a:bodyPr/>
@@ -1038,10 +1038,10 @@
         <a:lstStyle/>
         <a:p>
           <a:r>
-            <a:rPr lang="nl-NL"/>
-            <a:t>Retrospective</a:t>
+            <a:rPr lang="nl-NL" dirty="0"/>
+            <a:t>Volgende Sprint</a:t>
           </a:r>
-          <a:endParaRPr lang="en-US"/>
+          <a:endParaRPr lang="en-US" dirty="0"/>
         </a:p>
       </dgm:t>
     </dgm:pt>
@@ -1075,10 +1075,10 @@
         <a:lstStyle/>
         <a:p>
           <a:r>
-            <a:rPr lang="nl-NL"/>
-            <a:t>Volgende Sprint</a:t>
+            <a:rPr lang="nl-NL" dirty="0" err="1"/>
+            <a:t>Retrospective</a:t>
           </a:r>
-          <a:endParaRPr lang="en-US"/>
+          <a:endParaRPr lang="en-US" dirty="0"/>
         </a:p>
       </dgm:t>
     </dgm:pt>
@@ -1767,10 +1767,10 @@
             <a:buNone/>
           </a:pPr>
           <a:r>
-            <a:rPr lang="nl-NL" sz="4200" kern="1200"/>
-            <a:t>Retrospective</a:t>
+            <a:rPr lang="nl-NL" sz="4200" kern="1200" dirty="0"/>
+            <a:t>Volgende Sprint</a:t>
           </a:r>
-          <a:endParaRPr lang="en-US" sz="4200" kern="1200"/>
+          <a:endParaRPr lang="en-US" sz="4200" kern="1200" dirty="0"/>
         </a:p>
       </dsp:txBody>
       <dsp:txXfrm>
@@ -1900,10 +1900,10 @@
             <a:buNone/>
           </a:pPr>
           <a:r>
-            <a:rPr lang="nl-NL" sz="4200" kern="1200"/>
-            <a:t>Volgende Sprint</a:t>
+            <a:rPr lang="nl-NL" sz="4200" kern="1200" dirty="0" err="1"/>
+            <a:t>Retrospective</a:t>
           </a:r>
-          <a:endParaRPr lang="en-US" sz="4200" kern="1200"/>
+          <a:endParaRPr lang="en-US" sz="4200" kern="1200" dirty="0"/>
         </a:p>
       </dsp:txBody>
       <dsp:txXfrm>
@@ -9950,7 +9950,7 @@
             <p:ph idx="1"/>
             <p:extLst>
               <p:ext uri="{D42A27DB-BD31-4B8C-83A1-F6EECF244321}">
-                <p14:modId xmlns:p14="http://schemas.microsoft.com/office/powerpoint/2010/main" val="1461302005"/>
+                <p14:modId xmlns:p14="http://schemas.microsoft.com/office/powerpoint/2010/main" val="1897436345"/>
               </p:ext>
             </p:extLst>
           </p:nvPr>
@@ -14664,6 +14664,23 @@
 </file>
 
 <file path=customXml/item1.xml><?xml version="1.0" encoding="utf-8"?>
+<p:properties xmlns:p="http://schemas.microsoft.com/office/2006/metadata/properties" xmlns:xsi="http://www.w3.org/2001/XMLSchema-instance" xmlns:pc="http://schemas.microsoft.com/office/infopath/2007/PartnerControls">
+  <documentManagement>
+    <_activity xmlns="8d5dcd13-9b93-4860-8686-258dec0e23be" xsi:nil="true"/>
+  </documentManagement>
+</p:properties>
+</file>
+
+<file path=customXml/item2.xml><?xml version="1.0" encoding="utf-8"?>
+<?mso-contentType ?>
+<FormTemplates xmlns="http://schemas.microsoft.com/sharepoint/v3/contenttype/forms">
+  <Display>DocumentLibraryForm</Display>
+  <Edit>DocumentLibraryForm</Edit>
+  <New>DocumentLibraryForm</New>
+</FormTemplates>
+</file>
+
+<file path=customXml/item3.xml><?xml version="1.0" encoding="utf-8"?>
 <ct:contentTypeSchema xmlns:ct="http://schemas.microsoft.com/office/2006/metadata/contentType" xmlns:ma="http://schemas.microsoft.com/office/2006/metadata/properties/metaAttributes" ct:_="" ma:_="" ma:contentTypeName="Document" ma:contentTypeID="0x01010079D7DB9D69D51D4199EBB83E098F6C13" ma:contentTypeVersion="12" ma:contentTypeDescription="Create a new document." ma:contentTypeScope="" ma:versionID="ceb163bb5f87e201cdc653da3b4d8be7">
   <xsd:schema xmlns:xsd="http://www.w3.org/2001/XMLSchema" xmlns:xs="http://www.w3.org/2001/XMLSchema" xmlns:p="http://schemas.microsoft.com/office/2006/metadata/properties" xmlns:ns3="8d5dcd13-9b93-4860-8686-258dec0e23be" targetNamespace="http://schemas.microsoft.com/office/2006/metadata/properties" ma:root="true" ma:fieldsID="28cc82626ae761b4ac7541494d6f1d1e" ns3:_="">
     <xsd:import namespace="8d5dcd13-9b93-4860-8686-258dec0e23be"/>
@@ -14857,24 +14874,31 @@
 </ct:contentTypeSchema>
 </file>
 
-<file path=customXml/item2.xml><?xml version="1.0" encoding="utf-8"?>
-<?mso-contentType ?>
-<FormTemplates xmlns="http://schemas.microsoft.com/sharepoint/v3/contenttype/forms">
-  <Display>DocumentLibraryForm</Display>
-  <Edit>DocumentLibraryForm</Edit>
-  <New>DocumentLibraryForm</New>
-</FormTemplates>
+<file path=customXml/itemProps1.xml><?xml version="1.0" encoding="utf-8"?>
+<ds:datastoreItem xmlns:ds="http://schemas.openxmlformats.org/officeDocument/2006/customXml" ds:itemID="{6BE63DC0-0E79-4D45-AB99-081F8145E24C}">
+  <ds:schemaRefs>
+    <ds:schemaRef ds:uri="http://purl.org/dc/terms/"/>
+    <ds:schemaRef ds:uri="http://schemas.microsoft.com/office/infopath/2007/PartnerControls"/>
+    <ds:schemaRef ds:uri="http://schemas.openxmlformats.org/package/2006/metadata/core-properties"/>
+    <ds:schemaRef ds:uri="http://purl.org/dc/elements/1.1/"/>
+    <ds:schemaRef ds:uri="http://schemas.microsoft.com/office/2006/documentManagement/types"/>
+    <ds:schemaRef ds:uri="http://www.w3.org/XML/1998/namespace"/>
+    <ds:schemaRef ds:uri="8d5dcd13-9b93-4860-8686-258dec0e23be"/>
+    <ds:schemaRef ds:uri="http://schemas.microsoft.com/office/2006/metadata/properties"/>
+    <ds:schemaRef ds:uri="http://purl.org/dc/dcmitype/"/>
+  </ds:schemaRefs>
+</ds:datastoreItem>
 </file>
 
-<file path=customXml/item3.xml><?xml version="1.0" encoding="utf-8"?>
-<p:properties xmlns:p="http://schemas.microsoft.com/office/2006/metadata/properties" xmlns:xsi="http://www.w3.org/2001/XMLSchema-instance" xmlns:pc="http://schemas.microsoft.com/office/infopath/2007/PartnerControls">
-  <documentManagement>
-    <_activity xmlns="8d5dcd13-9b93-4860-8686-258dec0e23be" xsi:nil="true"/>
-  </documentManagement>
-</p:properties>
+<file path=customXml/itemProps2.xml><?xml version="1.0" encoding="utf-8"?>
+<ds:datastoreItem xmlns:ds="http://schemas.openxmlformats.org/officeDocument/2006/customXml" ds:itemID="{33D4CFAA-434D-4462-B62D-1E23E4045646}">
+  <ds:schemaRefs>
+    <ds:schemaRef ds:uri="http://schemas.microsoft.com/sharepoint/v3/contenttype/forms"/>
+  </ds:schemaRefs>
+</ds:datastoreItem>
 </file>
 
-<file path=customXml/itemProps1.xml><?xml version="1.0" encoding="utf-8"?>
+<file path=customXml/itemProps3.xml><?xml version="1.0" encoding="utf-8"?>
 <ds:datastoreItem xmlns:ds="http://schemas.openxmlformats.org/officeDocument/2006/customXml" ds:itemID="{7685628E-9CEE-488E-843E-DA0262089D08}">
   <ds:schemaRefs>
     <ds:schemaRef ds:uri="http://schemas.microsoft.com/office/2006/metadata/contentType"/>
@@ -14890,28 +14914,4 @@
     <ds:schemaRef ds:uri="http://schemas.microsoft.com/internal/obd"/>
   </ds:schemaRefs>
 </ds:datastoreItem>
-</file>
-
-<file path=customXml/itemProps2.xml><?xml version="1.0" encoding="utf-8"?>
-<ds:datastoreItem xmlns:ds="http://schemas.openxmlformats.org/officeDocument/2006/customXml" ds:itemID="{33D4CFAA-434D-4462-B62D-1E23E4045646}">
-  <ds:schemaRefs>
-    <ds:schemaRef ds:uri="http://schemas.microsoft.com/sharepoint/v3/contenttype/forms"/>
-  </ds:schemaRefs>
-</ds:datastoreItem>
-</file>
-
-<file path=customXml/itemProps3.xml><?xml version="1.0" encoding="utf-8"?>
-<ds:datastoreItem xmlns:ds="http://schemas.openxmlformats.org/officeDocument/2006/customXml" ds:itemID="{6BE63DC0-0E79-4D45-AB99-081F8145E24C}">
-  <ds:schemaRefs>
-    <ds:schemaRef ds:uri="http://purl.org/dc/terms/"/>
-    <ds:schemaRef ds:uri="http://schemas.microsoft.com/office/infopath/2007/PartnerControls"/>
-    <ds:schemaRef ds:uri="http://schemas.openxmlformats.org/package/2006/metadata/core-properties"/>
-    <ds:schemaRef ds:uri="http://purl.org/dc/elements/1.1/"/>
-    <ds:schemaRef ds:uri="http://schemas.microsoft.com/office/2006/documentManagement/types"/>
-    <ds:schemaRef ds:uri="http://www.w3.org/XML/1998/namespace"/>
-    <ds:schemaRef ds:uri="8d5dcd13-9b93-4860-8686-258dec0e23be"/>
-    <ds:schemaRef ds:uri="http://schemas.microsoft.com/office/2006/metadata/properties"/>
-    <ds:schemaRef ds:uri="http://purl.org/dc/dcmitype/"/>
-  </ds:schemaRefs>
-</ds:datastoreItem>
 </file>
</xml_diff>

<commit_message>
Sprint 3 presentatie aangemaakt, aanpassingen product backlog
</commit_message>
<xml_diff>
--- a/Presentaties/Sprint 2.pptx
+++ b/Presentaties/Sprint 2.pptx
@@ -3628,7 +3628,7 @@
           <a:p>
             <a:fld id="{4A37A092-F479-4C17-8DAB-26C19D8DEF50}" type="datetimeFigureOut">
               <a:rPr lang="nl-NL" smtClean="0"/>
-              <a:t>7-10-2025</a:t>
+              <a:t>28-10-2025</a:t>
             </a:fld>
             <a:endParaRPr lang="nl-NL"/>
           </a:p>
@@ -3919,7 +3919,7 @@
           <a:p>
             <a:fld id="{4A37A092-F479-4C17-8DAB-26C19D8DEF50}" type="datetimeFigureOut">
               <a:rPr lang="nl-NL" smtClean="0"/>
-              <a:t>7-10-2025</a:t>
+              <a:t>28-10-2025</a:t>
             </a:fld>
             <a:endParaRPr lang="nl-NL"/>
           </a:p>
@@ -4178,7 +4178,7 @@
           <a:p>
             <a:fld id="{4A37A092-F479-4C17-8DAB-26C19D8DEF50}" type="datetimeFigureOut">
               <a:rPr lang="nl-NL" smtClean="0"/>
-              <a:t>7-10-2025</a:t>
+              <a:t>28-10-2025</a:t>
             </a:fld>
             <a:endParaRPr lang="nl-NL"/>
           </a:p>
@@ -4647,7 +4647,7 @@
           <a:p>
             <a:fld id="{4A37A092-F479-4C17-8DAB-26C19D8DEF50}" type="datetimeFigureOut">
               <a:rPr lang="nl-NL" smtClean="0"/>
-              <a:t>7-10-2025</a:t>
+              <a:t>28-10-2025</a:t>
             </a:fld>
             <a:endParaRPr lang="nl-NL"/>
           </a:p>
@@ -4827,7 +4827,7 @@
           <a:p>
             <a:fld id="{4A37A092-F479-4C17-8DAB-26C19D8DEF50}" type="datetimeFigureOut">
               <a:rPr lang="nl-NL" smtClean="0"/>
-              <a:t>7-10-2025</a:t>
+              <a:t>28-10-2025</a:t>
             </a:fld>
             <a:endParaRPr lang="nl-NL"/>
           </a:p>
@@ -5403,7 +5403,7 @@
           <a:p>
             <a:fld id="{4A37A092-F479-4C17-8DAB-26C19D8DEF50}" type="datetimeFigureOut">
               <a:rPr lang="nl-NL" smtClean="0"/>
-              <a:t>7-10-2025</a:t>
+              <a:t>28-10-2025</a:t>
             </a:fld>
             <a:endParaRPr lang="nl-NL"/>
           </a:p>
@@ -5735,7 +5735,7 @@
           <a:p>
             <a:fld id="{4A37A092-F479-4C17-8DAB-26C19D8DEF50}" type="datetimeFigureOut">
               <a:rPr lang="nl-NL" smtClean="0"/>
-              <a:t>7-10-2025</a:t>
+              <a:t>28-10-2025</a:t>
             </a:fld>
             <a:endParaRPr lang="nl-NL"/>
           </a:p>
@@ -5910,7 +5910,7 @@
           <a:p>
             <a:fld id="{4A37A092-F479-4C17-8DAB-26C19D8DEF50}" type="datetimeFigureOut">
               <a:rPr lang="nl-NL" smtClean="0"/>
-              <a:t>7-10-2025</a:t>
+              <a:t>28-10-2025</a:t>
             </a:fld>
             <a:endParaRPr lang="nl-NL"/>
           </a:p>
@@ -6090,7 +6090,7 @@
           <a:p>
             <a:fld id="{4A37A092-F479-4C17-8DAB-26C19D8DEF50}" type="datetimeFigureOut">
               <a:rPr lang="nl-NL" smtClean="0"/>
-              <a:t>7-10-2025</a:t>
+              <a:t>28-10-2025</a:t>
             </a:fld>
             <a:endParaRPr lang="nl-NL"/>
           </a:p>
@@ -6260,7 +6260,7 @@
           <a:p>
             <a:fld id="{4A37A092-F479-4C17-8DAB-26C19D8DEF50}" type="datetimeFigureOut">
               <a:rPr lang="nl-NL" smtClean="0"/>
-              <a:t>7-10-2025</a:t>
+              <a:t>28-10-2025</a:t>
             </a:fld>
             <a:endParaRPr lang="nl-NL"/>
           </a:p>
@@ -6517,7 +6517,7 @@
           <a:p>
             <a:fld id="{4A37A092-F479-4C17-8DAB-26C19D8DEF50}" type="datetimeFigureOut">
               <a:rPr lang="nl-NL" smtClean="0"/>
-              <a:t>7-10-2025</a:t>
+              <a:t>28-10-2025</a:t>
             </a:fld>
             <a:endParaRPr lang="nl-NL"/>
           </a:p>
@@ -6809,7 +6809,7 @@
           <a:p>
             <a:fld id="{4A37A092-F479-4C17-8DAB-26C19D8DEF50}" type="datetimeFigureOut">
               <a:rPr lang="nl-NL" smtClean="0"/>
-              <a:t>7-10-2025</a:t>
+              <a:t>28-10-2025</a:t>
             </a:fld>
             <a:endParaRPr lang="nl-NL"/>
           </a:p>
@@ -7239,7 +7239,7 @@
           <a:p>
             <a:fld id="{4A37A092-F479-4C17-8DAB-26C19D8DEF50}" type="datetimeFigureOut">
               <a:rPr lang="nl-NL" smtClean="0"/>
-              <a:t>7-10-2025</a:t>
+              <a:t>28-10-2025</a:t>
             </a:fld>
             <a:endParaRPr lang="nl-NL"/>
           </a:p>
@@ -7357,7 +7357,7 @@
           <a:p>
             <a:fld id="{4A37A092-F479-4C17-8DAB-26C19D8DEF50}" type="datetimeFigureOut">
               <a:rPr lang="nl-NL" smtClean="0"/>
-              <a:t>7-10-2025</a:t>
+              <a:t>28-10-2025</a:t>
             </a:fld>
             <a:endParaRPr lang="nl-NL"/>
           </a:p>
@@ -7452,7 +7452,7 @@
           <a:p>
             <a:fld id="{4A37A092-F479-4C17-8DAB-26C19D8DEF50}" type="datetimeFigureOut">
               <a:rPr lang="nl-NL" smtClean="0"/>
-              <a:t>7-10-2025</a:t>
+              <a:t>28-10-2025</a:t>
             </a:fld>
             <a:endParaRPr lang="nl-NL"/>
           </a:p>
@@ -7735,7 +7735,7 @@
           <a:p>
             <a:fld id="{4A37A092-F479-4C17-8DAB-26C19D8DEF50}" type="datetimeFigureOut">
               <a:rPr lang="nl-NL" smtClean="0"/>
-              <a:t>7-10-2025</a:t>
+              <a:t>28-10-2025</a:t>
             </a:fld>
             <a:endParaRPr lang="nl-NL"/>
           </a:p>
@@ -8026,7 +8026,7 @@
           <a:p>
             <a:fld id="{4A37A092-F479-4C17-8DAB-26C19D8DEF50}" type="datetimeFigureOut">
               <a:rPr lang="nl-NL" smtClean="0"/>
-              <a:t>7-10-2025</a:t>
+              <a:t>28-10-2025</a:t>
             </a:fld>
             <a:endParaRPr lang="nl-NL"/>
           </a:p>
@@ -8257,7 +8257,7 @@
           <a:p>
             <a:fld id="{4A37A092-F479-4C17-8DAB-26C19D8DEF50}" type="datetimeFigureOut">
               <a:rPr lang="nl-NL" smtClean="0"/>
-              <a:t>7-10-2025</a:t>
+              <a:t>28-10-2025</a:t>
             </a:fld>
             <a:endParaRPr lang="nl-NL"/>
           </a:p>

</xml_diff>